<commit_message>
Update Musical Instrument Classification Using a Hybrid Neural Network BuellShortv2.pptx
</commit_message>
<xml_diff>
--- a/JMMPaper/Musical Instrument Classification Using a Hybrid Neural Network BuellShortv2.pptx
+++ b/JMMPaper/Musical Instrument Classification Using a Hybrid Neural Network BuellShortv2.pptx
@@ -9,8 +9,8 @@
   </p:notesMasterIdLst>
   <p:sldIdLst>
     <p:sldId id="256" r:id="rId2"/>
-    <p:sldId id="258" r:id="rId3"/>
-    <p:sldId id="289" r:id="rId4"/>
+    <p:sldId id="289" r:id="rId3"/>
+    <p:sldId id="258" r:id="rId4"/>
     <p:sldId id="257" r:id="rId5"/>
     <p:sldId id="259" r:id="rId6"/>
     <p:sldId id="260" r:id="rId7"/>
@@ -5679,7 +5679,23 @@
           </a:pPr>
           <a:r>
             <a:rPr lang="en-US" dirty="0"/>
-            <a:t>This is called Multimodal Deep Learning</a:t>
+            <a:t>This is called </a:t>
+          </a:r>
+          <a:r>
+            <a:rPr lang="en-US" i="1" dirty="0"/>
+            <a:t>Multimodal</a:t>
+          </a:r>
+          <a:r>
+            <a:rPr lang="en-US" i="0" dirty="0"/>
+            <a:t> or M</a:t>
+          </a:r>
+          <a:r>
+            <a:rPr lang="en-US" i="1" dirty="0"/>
+            <a:t>ultiview</a:t>
+          </a:r>
+          <a:r>
+            <a:rPr lang="en-US" dirty="0"/>
+            <a:t> Deep Learning</a:t>
           </a:r>
         </a:p>
       </dgm:t>
@@ -8037,7 +8053,23 @@
           </a:pPr>
           <a:r>
             <a:rPr lang="en-US" sz="2400" kern="1200" dirty="0"/>
-            <a:t>This is called Multimodal Deep Learning</a:t>
+            <a:t>This is called </a:t>
+          </a:r>
+          <a:r>
+            <a:rPr lang="en-US" sz="2400" i="1" kern="1200" dirty="0"/>
+            <a:t>Multimodal</a:t>
+          </a:r>
+          <a:r>
+            <a:rPr lang="en-US" sz="2400" i="0" kern="1200" dirty="0"/>
+            <a:t> or M</a:t>
+          </a:r>
+          <a:r>
+            <a:rPr lang="en-US" sz="2400" i="1" kern="1200" dirty="0"/>
+            <a:t>ultiview</a:t>
+          </a:r>
+          <a:r>
+            <a:rPr lang="en-US" sz="2400" kern="1200" dirty="0"/>
+            <a:t> Deep Learning</a:t>
           </a:r>
         </a:p>
       </dsp:txBody>
@@ -16020,7 +16052,7 @@
           <a:p>
             <a:fld id="{FBD822EA-6EB6-41E3-9582-0C976F415B9F}" type="datetimeFigureOut">
               <a:rPr lang="en-US" smtClean="0"/>
-              <a:t>1/6/2021</a:t>
+              <a:t>1/7/2021</a:t>
             </a:fld>
             <a:endParaRPr lang="en-US"/>
           </a:p>
@@ -16455,7 +16487,7 @@
           <a:p>
             <a:fld id="{9E016143-E03C-4CFD-AFDC-14E5BDEA754C}" type="datetimeFigureOut">
               <a:rPr lang="en-US" smtClean="0"/>
-              <a:t>1/6/2021</a:t>
+              <a:t>1/7/2021</a:t>
             </a:fld>
             <a:endParaRPr lang="en-US" dirty="0"/>
           </a:p>
@@ -16684,7 +16716,7 @@
           <a:p>
             <a:fld id="{C033E54A-A8CA-48C1-9504-691B58049D29}" type="datetimeFigureOut">
               <a:rPr lang="en-US" smtClean="0"/>
-              <a:t>1/6/2021</a:t>
+              <a:t>1/7/2021</a:t>
             </a:fld>
             <a:endParaRPr lang="en-US" dirty="0"/>
           </a:p>
@@ -16864,7 +16896,7 @@
           <a:p>
             <a:fld id="{B5F6C806-BBF7-471C-9527-881CE2266695}" type="datetimeFigureOut">
               <a:rPr lang="en-US" smtClean="0"/>
-              <a:t>1/6/2021</a:t>
+              <a:t>1/7/2021</a:t>
             </a:fld>
             <a:endParaRPr lang="en-US" dirty="0"/>
           </a:p>
@@ -17034,7 +17066,7 @@
           <a:p>
             <a:fld id="{78C94063-DF36-4330-A365-08DA1FA5B7D6}" type="datetimeFigureOut">
               <a:rPr lang="en-US" smtClean="0"/>
-              <a:t>1/6/2021</a:t>
+              <a:t>1/7/2021</a:t>
             </a:fld>
             <a:endParaRPr lang="en-US" dirty="0"/>
           </a:p>
@@ -17288,7 +17320,7 @@
           <a:p>
             <a:fld id="{908A7C6C-0F39-4D70-8E8D-FE5B9C95FA73}" type="datetimeFigureOut">
               <a:rPr lang="en-US" smtClean="0"/>
-              <a:t>1/6/2021</a:t>
+              <a:t>1/7/2021</a:t>
             </a:fld>
             <a:endParaRPr lang="en-US" dirty="0"/>
           </a:p>
@@ -17614,7 +17646,7 @@
           <a:p>
             <a:fld id="{DFCFA4AC-08CC-42CE-BD01-C191750A04EC}" type="datetimeFigureOut">
               <a:rPr lang="en-US" smtClean="0"/>
-              <a:t>1/6/2021</a:t>
+              <a:t>1/7/2021</a:t>
             </a:fld>
             <a:endParaRPr lang="en-US" dirty="0"/>
           </a:p>
@@ -18065,7 +18097,7 @@
           <a:p>
             <a:fld id="{1BA7A723-92A7-435B-B681-F25B092FEFEB}" type="datetimeFigureOut">
               <a:rPr lang="en-US" smtClean="0"/>
-              <a:t>1/6/2021</a:t>
+              <a:t>1/7/2021</a:t>
             </a:fld>
             <a:endParaRPr lang="en-US" dirty="0"/>
           </a:p>
@@ -18183,7 +18215,7 @@
           <a:p>
             <a:fld id="{4F170639-886C-4FCF-9EAB-ABB5DA3F3F4A}" type="datetimeFigureOut">
               <a:rPr lang="en-US" smtClean="0"/>
-              <a:t>1/6/2021</a:t>
+              <a:t>1/7/2021</a:t>
             </a:fld>
             <a:endParaRPr lang="en-US" dirty="0"/>
           </a:p>
@@ -18278,7 +18310,7 @@
           <a:p>
             <a:fld id="{22230651-31F4-45D2-98AE-A2108F41BC07}" type="datetimeFigureOut">
               <a:rPr lang="en-US" smtClean="0"/>
-              <a:t>1/6/2021</a:t>
+              <a:t>1/7/2021</a:t>
             </a:fld>
             <a:endParaRPr lang="en-US" dirty="0"/>
           </a:p>
@@ -18565,7 +18597,7 @@
           <a:p>
             <a:fld id="{6F53789A-C914-4DB1-8815-80B5EC7335C5}" type="datetimeFigureOut">
               <a:rPr lang="en-US" smtClean="0"/>
-              <a:t>1/6/2021</a:t>
+              <a:t>1/7/2021</a:t>
             </a:fld>
             <a:endParaRPr lang="en-US" dirty="0"/>
           </a:p>
@@ -18887,7 +18919,7 @@
           <a:p>
             <a:fld id="{5E6440AA-91A0-436F-8FDB-C0F939DCAE21}" type="datetimeFigureOut">
               <a:rPr lang="en-US" smtClean="0"/>
-              <a:t>1/6/2021</a:t>
+              <a:t>1/7/2021</a:t>
             </a:fld>
             <a:endParaRPr lang="en-US" dirty="0"/>
           </a:p>
@@ -19141,7 +19173,7 @@
           <a:p>
             <a:fld id="{0E59FD0C-5451-4CA0-86AF-E70AE3279989}" type="datetimeFigureOut">
               <a:rPr lang="en-US" smtClean="0"/>
-              <a:t>1/6/2021</a:t>
+              <a:t>1/7/2021</a:t>
             </a:fld>
             <a:endParaRPr lang="en-US" dirty="0"/>
           </a:p>
@@ -19702,26 +19734,26 @@
           <a:lstStyle/>
           <a:p>
             <a:r>
-              <a:rPr lang="en-US" sz="1400" dirty="0"/>
+              <a:rPr lang="en-US" sz="1400" b="1" dirty="0"/>
               <a:t>Landon Buell</a:t>
             </a:r>
           </a:p>
           <a:p>
             <a:r>
               <a:rPr lang="en-US" sz="1400" dirty="0"/>
-              <a:t>Senior, Physics B.S. Major</a:t>
+              <a:t>B.S. Physics, Dec 2020</a:t>
+            </a:r>
+          </a:p>
+          <a:p>
+            <a:r>
+              <a:rPr lang="en-US" sz="1400" dirty="0"/>
+              <a:t>M.S. Computer Science, Exp. 2024</a:t>
             </a:r>
           </a:p>
           <a:p>
             <a:r>
               <a:rPr lang="en-US" sz="1400" dirty="0"/>
               <a:t>University of New Hampshire</a:t>
-            </a:r>
-          </a:p>
-          <a:p>
-            <a:r>
-              <a:rPr lang="en-US" sz="1400" dirty="0"/>
-              <a:t>8 Jan 2020</a:t>
             </a:r>
           </a:p>
         </p:txBody>
@@ -20000,7 +20032,7 @@
           </a:lstStyle>
           <a:p>
             <a:r>
-              <a:rPr lang="en-US" sz="1400" dirty="0"/>
+              <a:rPr lang="en-US" sz="1400" b="1" dirty="0"/>
               <a:t>Kevin Short</a:t>
             </a:r>
           </a:p>
@@ -20024,6 +20056,41 @@
           </a:p>
           <a:p>
             <a:endParaRPr lang="en-US" dirty="0"/>
+          </a:p>
+        </p:txBody>
+      </p:sp>
+      <p:sp>
+        <p:nvSpPr>
+          <p:cNvPr id="8" name="TextBox 7">
+            <a:extLst>
+              <a:ext uri="{FF2B5EF4-FFF2-40B4-BE49-F238E27FC236}">
+                <a16:creationId xmlns:a16="http://schemas.microsoft.com/office/drawing/2014/main" id="{F36B5EBE-72FC-4F26-8F54-7DC8AA756313}"/>
+              </a:ext>
+            </a:extLst>
+          </p:cNvPr>
+          <p:cNvSpPr txBox="1"/>
+          <p:nvPr/>
+        </p:nvSpPr>
+        <p:spPr>
+          <a:xfrm>
+            <a:off x="10794962" y="6417934"/>
+            <a:ext cx="1607158" cy="369332"/>
+          </a:xfrm>
+          <a:prstGeom prst="rect">
+            <a:avLst/>
+          </a:prstGeom>
+          <a:noFill/>
+        </p:spPr>
+        <p:txBody>
+          <a:bodyPr wrap="square">
+            <a:spAutoFit/>
+          </a:bodyPr>
+          <a:lstStyle/>
+          <a:p>
+            <a:r>
+              <a:rPr lang="en-US" sz="1800" dirty="0"/>
+              <a:t>8 Jan 2021</a:t>
+            </a:r>
           </a:p>
         </p:txBody>
       </p:sp>
@@ -20085,8 +20152,8 @@
           </a:p>
         </p:txBody>
       </p:sp>
-      <mc:AlternateContent xmlns:mc="http://schemas.openxmlformats.org/markup-compatibility/2006">
-        <mc:Choice xmlns:a14="http://schemas.microsoft.com/office/drawing/2010/main" Requires="a14">
+      <mc:AlternateContent xmlns:mc="http://schemas.openxmlformats.org/markup-compatibility/2006" xmlns:a14="http://schemas.microsoft.com/office/drawing/2010/main">
+        <mc:Choice Requires="a14">
           <p:sp>
             <p:nvSpPr>
               <p:cNvPr id="3" name="Content Placeholder 2">
@@ -20408,7 +20475,7 @@
             </p:txBody>
           </p:sp>
         </mc:Choice>
-        <mc:Fallback>
+        <mc:Fallback xmlns="">
           <p:sp>
             <p:nvSpPr>
               <p:cNvPr id="3" name="Content Placeholder 2">
@@ -23422,8 +23489,8 @@
           </a:p>
         </p:txBody>
       </p:sp>
-      <mc:AlternateContent xmlns:mc="http://schemas.openxmlformats.org/markup-compatibility/2006">
-        <mc:Choice xmlns:a14="http://schemas.microsoft.com/office/drawing/2010/main" Requires="a14">
+      <mc:AlternateContent xmlns:mc="http://schemas.openxmlformats.org/markup-compatibility/2006" xmlns:a14="http://schemas.microsoft.com/office/drawing/2010/main">
+        <mc:Choice Requires="a14">
           <p:sp>
             <p:nvSpPr>
               <p:cNvPr id="3" name="Content Placeholder 2">
@@ -23870,7 +23937,7 @@
             </p:txBody>
           </p:sp>
         </mc:Choice>
-        <mc:Fallback>
+        <mc:Fallback xmlns="">
           <p:sp>
             <p:nvSpPr>
               <p:cNvPr id="3" name="Content Placeholder 2">
@@ -29672,6 +29739,13 @@
             </a:r>
           </a:p>
           <a:p>
+            <a:pPr lvl="1"/>
+            <a:r>
+              <a:rPr lang="en-US" dirty="0"/>
+              <a:t>1D vs. 2D Inputs</a:t>
+            </a:r>
+          </a:p>
+          <a:p>
             <a:endParaRPr lang="en-US" i="1" dirty="0"/>
           </a:p>
           <a:p>
@@ -32225,9 +32299,7 @@
     <p:bg>
       <p:bgPr>
         <a:solidFill>
-          <a:schemeClr val="bg2">
-            <a:lumMod val="75000"/>
-          </a:schemeClr>
+          <a:schemeClr val="bg1"/>
         </a:solidFill>
         <a:effectLst/>
       </p:bgPr>
@@ -32246,12 +32318,12 @@
           <a:chExt cx="0" cy="0"/>
         </a:xfrm>
       </p:grpSpPr>
-      <p:sp>
+      <p:sp useBgFill="1">
         <p:nvSpPr>
-          <p:cNvPr id="8" name="Rectangle 7">
+          <p:cNvPr id="9" name="Rectangle 8">
             <a:extLst>
               <a:ext uri="{FF2B5EF4-FFF2-40B4-BE49-F238E27FC236}">
-                <a16:creationId xmlns:a16="http://schemas.microsoft.com/office/drawing/2014/main" id="{A6F05DDE-5F2C-44F5-BACC-DED4737B11B8}"/>
+                <a16:creationId xmlns:a16="http://schemas.microsoft.com/office/drawing/2014/main" id="{876248C8-0720-48AB-91BA-5F530BB41E5E}"/>
               </a:ext>
               <a:ext uri="{C183D7F6-B498-43B3-948B-1728B52AA6E4}">
                 <adec:decorative xmlns:adec="http://schemas.microsoft.com/office/drawing/2017/decorative" val="1"/>
@@ -32271,143 +32343,12 @@
         </p:nvSpPr>
         <p:spPr>
           <a:xfrm>
-            <a:off x="0" y="0"/>
-            <a:ext cx="457200" cy="6858000"/>
+            <a:off x="-1" y="0"/>
+            <a:ext cx="12220924" cy="6858000"/>
           </a:xfrm>
           <a:prstGeom prst="rect">
             <a:avLst/>
           </a:prstGeom>
-          <a:solidFill>
-            <a:schemeClr val="accent1"/>
-          </a:solidFill>
-          <a:ln>
-            <a:noFill/>
-          </a:ln>
-        </p:spPr>
-        <p:style>
-          <a:lnRef idx="2">
-            <a:schemeClr val="accent1">
-              <a:shade val="50000"/>
-            </a:schemeClr>
-          </a:lnRef>
-          <a:fillRef idx="1">
-            <a:schemeClr val="accent1"/>
-          </a:fillRef>
-          <a:effectRef idx="0">
-            <a:schemeClr val="accent1"/>
-          </a:effectRef>
-          <a:fontRef idx="minor">
-            <a:schemeClr val="lt1"/>
-          </a:fontRef>
-        </p:style>
-      </p:sp>
-      <p:sp>
-        <p:nvSpPr>
-          <p:cNvPr id="2" name="Title 1">
-            <a:extLst>
-              <a:ext uri="{FF2B5EF4-FFF2-40B4-BE49-F238E27FC236}">
-                <a16:creationId xmlns:a16="http://schemas.microsoft.com/office/drawing/2014/main" id="{51009190-5AE6-46E1-A58A-A5FB5522D7AF}"/>
-              </a:ext>
-            </a:extLst>
-          </p:cNvPr>
-          <p:cNvSpPr>
-            <a:spLocks noGrp="1"/>
-          </p:cNvSpPr>
-          <p:nvPr>
-            <p:ph type="title"/>
-          </p:nvPr>
-        </p:nvSpPr>
-        <p:spPr>
-          <a:xfrm>
-            <a:off x="4651947" y="758952"/>
-            <a:ext cx="6323519" cy="4041648"/>
-          </a:xfrm>
-        </p:spPr>
-        <p:txBody>
-          <a:bodyPr vert="horz" lIns="91440" tIns="45720" rIns="91440" bIns="45720" rtlCol="0" anchor="b">
-            <a:normAutofit/>
-          </a:bodyPr>
-          <a:lstStyle/>
-          <a:p>
-            <a:r>
-              <a:rPr lang="en-US" dirty="0"/>
-              <a:t>Introduction</a:t>
-            </a:r>
-          </a:p>
-        </p:txBody>
-      </p:sp>
-      <p:sp>
-        <p:nvSpPr>
-          <p:cNvPr id="3" name="Text Placeholder 2">
-            <a:extLst>
-              <a:ext uri="{FF2B5EF4-FFF2-40B4-BE49-F238E27FC236}">
-                <a16:creationId xmlns:a16="http://schemas.microsoft.com/office/drawing/2014/main" id="{F7F39D0B-53F5-408C-8C70-27D8C52ECE6A}"/>
-              </a:ext>
-            </a:extLst>
-          </p:cNvPr>
-          <p:cNvSpPr>
-            <a:spLocks noGrp="1"/>
-          </p:cNvSpPr>
-          <p:nvPr>
-            <p:ph type="body" idx="1"/>
-          </p:nvPr>
-        </p:nvSpPr>
-        <p:spPr>
-          <a:xfrm>
-            <a:off x="4651947" y="4800600"/>
-            <a:ext cx="6323520" cy="1691640"/>
-          </a:xfrm>
-        </p:spPr>
-        <p:txBody>
-          <a:bodyPr vert="horz" lIns="91440" tIns="45720" rIns="91440" bIns="45720" rtlCol="0">
-            <a:normAutofit/>
-          </a:bodyPr>
-          <a:lstStyle/>
-          <a:p>
-            <a:endParaRPr lang="en-US">
-              <a:solidFill>
-                <a:schemeClr val="tx1">
-                  <a:lumMod val="75000"/>
-                </a:schemeClr>
-              </a:solidFill>
-            </a:endParaRPr>
-          </a:p>
-        </p:txBody>
-      </p:sp>
-      <p:sp>
-        <p:nvSpPr>
-          <p:cNvPr id="10" name="Rectangle 9">
-            <a:extLst>
-              <a:ext uri="{FF2B5EF4-FFF2-40B4-BE49-F238E27FC236}">
-                <a16:creationId xmlns:a16="http://schemas.microsoft.com/office/drawing/2014/main" id="{A0F80B31-D942-4321-A7CC-3FF24C30A9FC}"/>
-              </a:ext>
-              <a:ext uri="{C183D7F6-B498-43B3-948B-1728B52AA6E4}">
-                <adec:decorative xmlns:adec="http://schemas.microsoft.com/office/drawing/2017/decorative" val="1"/>
-              </a:ext>
-            </a:extLst>
-          </p:cNvPr>
-          <p:cNvSpPr>
-            <a:spLocks noGrp="1" noRot="1" noChangeAspect="1" noMove="1" noResize="1" noEditPoints="1" noAdjustHandles="1" noChangeArrowheads="1" noChangeShapeType="1" noTextEdit="1"/>
-          </p:cNvSpPr>
-          <p:nvPr>
-            <p:extLst>
-              <p:ext uri="{386F3935-93C4-4BCD-93E2-E3B085C9AB24}">
-                <p16:designElem xmlns:p16="http://schemas.microsoft.com/office/powerpoint/2015/main" val="1"/>
-              </p:ext>
-            </p:extLst>
-          </p:nvPr>
-        </p:nvSpPr>
-        <p:spPr>
-          <a:xfrm>
-            <a:off x="0" y="0"/>
-            <a:ext cx="3568372" cy="6858000"/>
-          </a:xfrm>
-          <a:prstGeom prst="rect">
-            <a:avLst/>
-          </a:prstGeom>
-          <a:solidFill>
-            <a:schemeClr val="accent1"/>
-          </a:solidFill>
           <a:ln>
             <a:noFill/>
           </a:ln>
@@ -32439,10 +32380,45 @@
       </p:sp>
       <p:sp>
         <p:nvSpPr>
-          <p:cNvPr id="12" name="Rectangle 11">
+          <p:cNvPr id="2" name="Title 1">
             <a:extLst>
               <a:ext uri="{FF2B5EF4-FFF2-40B4-BE49-F238E27FC236}">
-                <a16:creationId xmlns:a16="http://schemas.microsoft.com/office/drawing/2014/main" id="{27DE213B-0A4F-4E9E-9153-8B0C2D0469BE}"/>
+                <a16:creationId xmlns:a16="http://schemas.microsoft.com/office/drawing/2014/main" id="{F986E15E-7F81-466C-9AE9-AEA62DF97E8F}"/>
+              </a:ext>
+            </a:extLst>
+          </p:cNvPr>
+          <p:cNvSpPr>
+            <a:spLocks noGrp="1"/>
+          </p:cNvSpPr>
+          <p:nvPr>
+            <p:ph type="title"/>
+          </p:nvPr>
+        </p:nvSpPr>
+        <p:spPr>
+          <a:xfrm>
+            <a:off x="1261871" y="365760"/>
+            <a:ext cx="9858383" cy="1325562"/>
+          </a:xfrm>
+        </p:spPr>
+        <p:txBody>
+          <a:bodyPr>
+            <a:normAutofit/>
+          </a:bodyPr>
+          <a:lstStyle/>
+          <a:p>
+            <a:r>
+              <a:rPr lang="en-US" dirty="0"/>
+              <a:t>Presentation Outline</a:t>
+            </a:r>
+          </a:p>
+        </p:txBody>
+      </p:sp>
+      <p:sp>
+        <p:nvSpPr>
+          <p:cNvPr id="11" name="Rectangle 10">
+            <a:extLst>
+              <a:ext uri="{FF2B5EF4-FFF2-40B4-BE49-F238E27FC236}">
+                <a16:creationId xmlns:a16="http://schemas.microsoft.com/office/drawing/2014/main" id="{523BEDA7-D0B8-4802-8168-92452653BC9F}"/>
               </a:ext>
               <a:ext uri="{C183D7F6-B498-43B3-948B-1728B52AA6E4}">
                 <adec:decorative xmlns:adec="http://schemas.microsoft.com/office/drawing/2017/decorative" val="1"/>
@@ -32462,16 +32438,15 @@
         </p:nvSpPr>
         <p:spPr>
           <a:xfrm>
-            <a:off x="3569969" y="0"/>
-            <a:ext cx="457200" cy="6858000"/>
+            <a:off x="0" y="0"/>
+            <a:ext cx="914400" cy="6858000"/>
           </a:xfrm>
           <a:prstGeom prst="rect">
             <a:avLst/>
           </a:prstGeom>
           <a:solidFill>
-            <a:schemeClr val="accent1">
+            <a:schemeClr val="tx2">
               <a:lumMod val="75000"/>
-              <a:alpha val="60000"/>
             </a:schemeClr>
           </a:solidFill>
           <a:ln>
@@ -32495,10 +32470,96 @@
           </a:fontRef>
         </p:style>
       </p:sp>
+      <p:sp>
+        <p:nvSpPr>
+          <p:cNvPr id="13" name="Rectangle 12">
+            <a:extLst>
+              <a:ext uri="{FF2B5EF4-FFF2-40B4-BE49-F238E27FC236}">
+                <a16:creationId xmlns:a16="http://schemas.microsoft.com/office/drawing/2014/main" id="{D2EFF34B-7B1A-4F9D-8CEE-A40962BC7C21}"/>
+              </a:ext>
+              <a:ext uri="{C183D7F6-B498-43B3-948B-1728B52AA6E4}">
+                <adec:decorative xmlns:adec="http://schemas.microsoft.com/office/drawing/2017/decorative" val="1"/>
+              </a:ext>
+            </a:extLst>
+          </p:cNvPr>
+          <p:cNvSpPr>
+            <a:spLocks noGrp="1" noRot="1" noChangeAspect="1" noMove="1" noResize="1" noEditPoints="1" noAdjustHandles="1" noChangeArrowheads="1" noChangeShapeType="1" noTextEdit="1"/>
+          </p:cNvSpPr>
+          <p:nvPr>
+            <p:extLst>
+              <p:ext uri="{386F3935-93C4-4BCD-93E2-E3B085C9AB24}">
+                <p16:designElem xmlns:p16="http://schemas.microsoft.com/office/powerpoint/2015/main" val="1"/>
+              </p:ext>
+            </p:extLst>
+          </p:nvPr>
+        </p:nvSpPr>
+        <p:spPr>
+          <a:xfrm>
+            <a:off x="11763724" y="0"/>
+            <a:ext cx="457200" cy="6858000"/>
+          </a:xfrm>
+          <a:prstGeom prst="rect">
+            <a:avLst/>
+          </a:prstGeom>
+          <a:solidFill>
+            <a:schemeClr val="accent1"/>
+          </a:solidFill>
+          <a:ln>
+            <a:noFill/>
+          </a:ln>
+        </p:spPr>
+        <p:style>
+          <a:lnRef idx="2">
+            <a:schemeClr val="accent1">
+              <a:shade val="50000"/>
+            </a:schemeClr>
+          </a:lnRef>
+          <a:fillRef idx="1">
+            <a:schemeClr val="accent1"/>
+          </a:fillRef>
+          <a:effectRef idx="0">
+            <a:schemeClr val="accent1"/>
+          </a:effectRef>
+          <a:fontRef idx="minor">
+            <a:schemeClr val="lt1"/>
+          </a:fontRef>
+        </p:style>
+      </p:sp>
+      <p:graphicFrame>
+        <p:nvGraphicFramePr>
+          <p:cNvPr id="5" name="Content Placeholder 2">
+            <a:extLst>
+              <a:ext uri="{FF2B5EF4-FFF2-40B4-BE49-F238E27FC236}">
+                <a16:creationId xmlns:a16="http://schemas.microsoft.com/office/drawing/2014/main" id="{309BE5D2-E9CA-4476-BC68-713F1871E7C0}"/>
+              </a:ext>
+            </a:extLst>
+          </p:cNvPr>
+          <p:cNvGraphicFramePr>
+            <a:graphicFrameLocks noGrp="1"/>
+          </p:cNvGraphicFramePr>
+          <p:nvPr>
+            <p:ph idx="1"/>
+            <p:extLst>
+              <p:ext uri="{D42A27DB-BD31-4B8C-83A1-F6EECF244321}">
+                <p14:modId xmlns:p14="http://schemas.microsoft.com/office/powerpoint/2010/main" val="4184016602"/>
+              </p:ext>
+            </p:extLst>
+          </p:nvPr>
+        </p:nvGraphicFramePr>
+        <p:xfrm>
+          <a:off x="1262063" y="2013055"/>
+          <a:ext cx="9858191" cy="4201478"/>
+        </p:xfrm>
+        <a:graphic>
+          <a:graphicData uri="http://schemas.openxmlformats.org/drawingml/2006/diagram">
+            <dgm:relIds xmlns:dgm="http://schemas.openxmlformats.org/drawingml/2006/diagram" xmlns:r="http://schemas.openxmlformats.org/officeDocument/2006/relationships" r:dm="rId2" r:lo="rId3" r:qs="rId4" r:cs="rId5"/>
+          </a:graphicData>
+        </a:graphic>
+      </p:graphicFrame>
     </p:spTree>
     <p:extLst>
       <p:ext uri="{BB962C8B-B14F-4D97-AF65-F5344CB8AC3E}">
-        <p14:creationId xmlns:p14="http://schemas.microsoft.com/office/powerpoint/2010/main" val="1015811613"/>
+        <p14:creationId xmlns:p14="http://schemas.microsoft.com/office/powerpoint/2010/main" val="4130503848"/>
       </p:ext>
     </p:extLst>
   </p:cSld>
@@ -32648,7 +32709,7 @@
             <p:ph idx="1"/>
             <p:extLst>
               <p:ext uri="{D42A27DB-BD31-4B8C-83A1-F6EECF244321}">
-                <p14:modId xmlns:p14="http://schemas.microsoft.com/office/powerpoint/2010/main" val="3573610829"/>
+                <p14:modId xmlns:p14="http://schemas.microsoft.com/office/powerpoint/2010/main" val="2680458675"/>
               </p:ext>
             </p:extLst>
           </p:nvPr>
@@ -33728,7 +33789,7 @@
           <a:p>
             <a:r>
               <a:rPr lang="en-US" dirty="0"/>
-              <a:t>Unimodal Confusion Matrices</a:t>
+              <a:t>Single NN Confusion Matrices</a:t>
             </a:r>
           </a:p>
         </p:txBody>
@@ -35764,7 +35825,7 @@
           <a:p>
             <a:r>
               <a:rPr lang="en-US" dirty="0"/>
-              <a:t>Multimodal Confusion Matrix</a:t>
+              <a:t>Hybrid NN Confusion Matrix</a:t>
             </a:r>
           </a:p>
         </p:txBody>
@@ -35850,7 +35911,7 @@
           <a:p>
             <a:r>
               <a:rPr lang="en-US" dirty="0"/>
-              <a:t>Multimodal models shows a stronger main diagonal</a:t>
+              <a:t>Hybrid model shows a stronger main diagonal</a:t>
             </a:r>
           </a:p>
           <a:p>
@@ -37324,9 +37385,10 @@
           <a:lstStyle/>
           <a:p>
             <a:r>
-              <a:rPr lang="en-US" dirty="0"/>
-              <a:t>Citations</a:t>
+              <a:rPr lang="en-US" dirty="0" err="1"/>
+              <a:t>Refrences</a:t>
             </a:r>
+            <a:endParaRPr lang="en-US" dirty="0"/>
           </a:p>
         </p:txBody>
       </p:sp>
@@ -38259,7 +38321,9 @@
     <p:bg>
       <p:bgPr>
         <a:solidFill>
-          <a:schemeClr val="bg1"/>
+          <a:schemeClr val="bg2">
+            <a:lumMod val="75000"/>
+          </a:schemeClr>
         </a:solidFill>
         <a:effectLst/>
       </p:bgPr>
@@ -38278,12 +38342,12 @@
           <a:chExt cx="0" cy="0"/>
         </a:xfrm>
       </p:grpSpPr>
-      <p:sp useBgFill="1">
+      <p:sp>
         <p:nvSpPr>
-          <p:cNvPr id="9" name="Rectangle 8">
+          <p:cNvPr id="8" name="Rectangle 7">
             <a:extLst>
               <a:ext uri="{FF2B5EF4-FFF2-40B4-BE49-F238E27FC236}">
-                <a16:creationId xmlns:a16="http://schemas.microsoft.com/office/drawing/2014/main" id="{876248C8-0720-48AB-91BA-5F530BB41E5E}"/>
+                <a16:creationId xmlns:a16="http://schemas.microsoft.com/office/drawing/2014/main" id="{A6F05DDE-5F2C-44F5-BACC-DED4737B11B8}"/>
               </a:ext>
               <a:ext uri="{C183D7F6-B498-43B3-948B-1728B52AA6E4}">
                 <adec:decorative xmlns:adec="http://schemas.microsoft.com/office/drawing/2017/decorative" val="1"/>
@@ -38303,12 +38367,143 @@
         </p:nvSpPr>
         <p:spPr>
           <a:xfrm>
-            <a:off x="-1" y="0"/>
-            <a:ext cx="12220924" cy="6858000"/>
+            <a:off x="0" y="0"/>
+            <a:ext cx="457200" cy="6858000"/>
           </a:xfrm>
           <a:prstGeom prst="rect">
             <a:avLst/>
           </a:prstGeom>
+          <a:solidFill>
+            <a:schemeClr val="accent1"/>
+          </a:solidFill>
+          <a:ln>
+            <a:noFill/>
+          </a:ln>
+        </p:spPr>
+        <p:style>
+          <a:lnRef idx="2">
+            <a:schemeClr val="accent1">
+              <a:shade val="50000"/>
+            </a:schemeClr>
+          </a:lnRef>
+          <a:fillRef idx="1">
+            <a:schemeClr val="accent1"/>
+          </a:fillRef>
+          <a:effectRef idx="0">
+            <a:schemeClr val="accent1"/>
+          </a:effectRef>
+          <a:fontRef idx="minor">
+            <a:schemeClr val="lt1"/>
+          </a:fontRef>
+        </p:style>
+      </p:sp>
+      <p:sp>
+        <p:nvSpPr>
+          <p:cNvPr id="2" name="Title 1">
+            <a:extLst>
+              <a:ext uri="{FF2B5EF4-FFF2-40B4-BE49-F238E27FC236}">
+                <a16:creationId xmlns:a16="http://schemas.microsoft.com/office/drawing/2014/main" id="{51009190-5AE6-46E1-A58A-A5FB5522D7AF}"/>
+              </a:ext>
+            </a:extLst>
+          </p:cNvPr>
+          <p:cNvSpPr>
+            <a:spLocks noGrp="1"/>
+          </p:cNvSpPr>
+          <p:nvPr>
+            <p:ph type="title"/>
+          </p:nvPr>
+        </p:nvSpPr>
+        <p:spPr>
+          <a:xfrm>
+            <a:off x="4651947" y="758952"/>
+            <a:ext cx="6323519" cy="4041648"/>
+          </a:xfrm>
+        </p:spPr>
+        <p:txBody>
+          <a:bodyPr vert="horz" lIns="91440" tIns="45720" rIns="91440" bIns="45720" rtlCol="0" anchor="b">
+            <a:normAutofit/>
+          </a:bodyPr>
+          <a:lstStyle/>
+          <a:p>
+            <a:r>
+              <a:rPr lang="en-US" dirty="0"/>
+              <a:t>Introduction</a:t>
+            </a:r>
+          </a:p>
+        </p:txBody>
+      </p:sp>
+      <p:sp>
+        <p:nvSpPr>
+          <p:cNvPr id="3" name="Text Placeholder 2">
+            <a:extLst>
+              <a:ext uri="{FF2B5EF4-FFF2-40B4-BE49-F238E27FC236}">
+                <a16:creationId xmlns:a16="http://schemas.microsoft.com/office/drawing/2014/main" id="{F7F39D0B-53F5-408C-8C70-27D8C52ECE6A}"/>
+              </a:ext>
+            </a:extLst>
+          </p:cNvPr>
+          <p:cNvSpPr>
+            <a:spLocks noGrp="1"/>
+          </p:cNvSpPr>
+          <p:nvPr>
+            <p:ph type="body" idx="1"/>
+          </p:nvPr>
+        </p:nvSpPr>
+        <p:spPr>
+          <a:xfrm>
+            <a:off x="4651947" y="4800600"/>
+            <a:ext cx="6323520" cy="1691640"/>
+          </a:xfrm>
+        </p:spPr>
+        <p:txBody>
+          <a:bodyPr vert="horz" lIns="91440" tIns="45720" rIns="91440" bIns="45720" rtlCol="0">
+            <a:normAutofit/>
+          </a:bodyPr>
+          <a:lstStyle/>
+          <a:p>
+            <a:endParaRPr lang="en-US">
+              <a:solidFill>
+                <a:schemeClr val="tx1">
+                  <a:lumMod val="75000"/>
+                </a:schemeClr>
+              </a:solidFill>
+            </a:endParaRPr>
+          </a:p>
+        </p:txBody>
+      </p:sp>
+      <p:sp>
+        <p:nvSpPr>
+          <p:cNvPr id="10" name="Rectangle 9">
+            <a:extLst>
+              <a:ext uri="{FF2B5EF4-FFF2-40B4-BE49-F238E27FC236}">
+                <a16:creationId xmlns:a16="http://schemas.microsoft.com/office/drawing/2014/main" id="{A0F80B31-D942-4321-A7CC-3FF24C30A9FC}"/>
+              </a:ext>
+              <a:ext uri="{C183D7F6-B498-43B3-948B-1728B52AA6E4}">
+                <adec:decorative xmlns:adec="http://schemas.microsoft.com/office/drawing/2017/decorative" val="1"/>
+              </a:ext>
+            </a:extLst>
+          </p:cNvPr>
+          <p:cNvSpPr>
+            <a:spLocks noGrp="1" noRot="1" noChangeAspect="1" noMove="1" noResize="1" noEditPoints="1" noAdjustHandles="1" noChangeArrowheads="1" noChangeShapeType="1" noTextEdit="1"/>
+          </p:cNvSpPr>
+          <p:nvPr>
+            <p:extLst>
+              <p:ext uri="{386F3935-93C4-4BCD-93E2-E3B085C9AB24}">
+                <p16:designElem xmlns:p16="http://schemas.microsoft.com/office/powerpoint/2015/main" val="1"/>
+              </p:ext>
+            </p:extLst>
+          </p:nvPr>
+        </p:nvSpPr>
+        <p:spPr>
+          <a:xfrm>
+            <a:off x="0" y="0"/>
+            <a:ext cx="3568372" cy="6858000"/>
+          </a:xfrm>
+          <a:prstGeom prst="rect">
+            <a:avLst/>
+          </a:prstGeom>
+          <a:solidFill>
+            <a:schemeClr val="accent1"/>
+          </a:solidFill>
           <a:ln>
             <a:noFill/>
           </a:ln>
@@ -38340,45 +38535,10 @@
       </p:sp>
       <p:sp>
         <p:nvSpPr>
-          <p:cNvPr id="2" name="Title 1">
+          <p:cNvPr id="12" name="Rectangle 11">
             <a:extLst>
               <a:ext uri="{FF2B5EF4-FFF2-40B4-BE49-F238E27FC236}">
-                <a16:creationId xmlns:a16="http://schemas.microsoft.com/office/drawing/2014/main" id="{F986E15E-7F81-466C-9AE9-AEA62DF97E8F}"/>
-              </a:ext>
-            </a:extLst>
-          </p:cNvPr>
-          <p:cNvSpPr>
-            <a:spLocks noGrp="1"/>
-          </p:cNvSpPr>
-          <p:nvPr>
-            <p:ph type="title"/>
-          </p:nvPr>
-        </p:nvSpPr>
-        <p:spPr>
-          <a:xfrm>
-            <a:off x="1261871" y="365760"/>
-            <a:ext cx="9858383" cy="1325562"/>
-          </a:xfrm>
-        </p:spPr>
-        <p:txBody>
-          <a:bodyPr>
-            <a:normAutofit/>
-          </a:bodyPr>
-          <a:lstStyle/>
-          <a:p>
-            <a:r>
-              <a:rPr lang="en-US" dirty="0"/>
-              <a:t>Presentation Outline</a:t>
-            </a:r>
-          </a:p>
-        </p:txBody>
-      </p:sp>
-      <p:sp>
-        <p:nvSpPr>
-          <p:cNvPr id="11" name="Rectangle 10">
-            <a:extLst>
-              <a:ext uri="{FF2B5EF4-FFF2-40B4-BE49-F238E27FC236}">
-                <a16:creationId xmlns:a16="http://schemas.microsoft.com/office/drawing/2014/main" id="{523BEDA7-D0B8-4802-8168-92452653BC9F}"/>
+                <a16:creationId xmlns:a16="http://schemas.microsoft.com/office/drawing/2014/main" id="{27DE213B-0A4F-4E9E-9153-8B0C2D0469BE}"/>
               </a:ext>
               <a:ext uri="{C183D7F6-B498-43B3-948B-1728B52AA6E4}">
                 <adec:decorative xmlns:adec="http://schemas.microsoft.com/office/drawing/2017/decorative" val="1"/>
@@ -38398,15 +38558,16 @@
         </p:nvSpPr>
         <p:spPr>
           <a:xfrm>
-            <a:off x="0" y="0"/>
-            <a:ext cx="914400" cy="6858000"/>
+            <a:off x="3569969" y="0"/>
+            <a:ext cx="457200" cy="6858000"/>
           </a:xfrm>
           <a:prstGeom prst="rect">
             <a:avLst/>
           </a:prstGeom>
           <a:solidFill>
-            <a:schemeClr val="tx2">
+            <a:schemeClr val="accent1">
               <a:lumMod val="75000"/>
+              <a:alpha val="60000"/>
             </a:schemeClr>
           </a:solidFill>
           <a:ln>
@@ -38430,96 +38591,10 @@
           </a:fontRef>
         </p:style>
       </p:sp>
-      <p:sp>
-        <p:nvSpPr>
-          <p:cNvPr id="13" name="Rectangle 12">
-            <a:extLst>
-              <a:ext uri="{FF2B5EF4-FFF2-40B4-BE49-F238E27FC236}">
-                <a16:creationId xmlns:a16="http://schemas.microsoft.com/office/drawing/2014/main" id="{D2EFF34B-7B1A-4F9D-8CEE-A40962BC7C21}"/>
-              </a:ext>
-              <a:ext uri="{C183D7F6-B498-43B3-948B-1728B52AA6E4}">
-                <adec:decorative xmlns:adec="http://schemas.microsoft.com/office/drawing/2017/decorative" val="1"/>
-              </a:ext>
-            </a:extLst>
-          </p:cNvPr>
-          <p:cNvSpPr>
-            <a:spLocks noGrp="1" noRot="1" noChangeAspect="1" noMove="1" noResize="1" noEditPoints="1" noAdjustHandles="1" noChangeArrowheads="1" noChangeShapeType="1" noTextEdit="1"/>
-          </p:cNvSpPr>
-          <p:nvPr>
-            <p:extLst>
-              <p:ext uri="{386F3935-93C4-4BCD-93E2-E3B085C9AB24}">
-                <p16:designElem xmlns:p16="http://schemas.microsoft.com/office/powerpoint/2015/main" val="1"/>
-              </p:ext>
-            </p:extLst>
-          </p:nvPr>
-        </p:nvSpPr>
-        <p:spPr>
-          <a:xfrm>
-            <a:off x="11763724" y="0"/>
-            <a:ext cx="457200" cy="6858000"/>
-          </a:xfrm>
-          <a:prstGeom prst="rect">
-            <a:avLst/>
-          </a:prstGeom>
-          <a:solidFill>
-            <a:schemeClr val="accent1"/>
-          </a:solidFill>
-          <a:ln>
-            <a:noFill/>
-          </a:ln>
-        </p:spPr>
-        <p:style>
-          <a:lnRef idx="2">
-            <a:schemeClr val="accent1">
-              <a:shade val="50000"/>
-            </a:schemeClr>
-          </a:lnRef>
-          <a:fillRef idx="1">
-            <a:schemeClr val="accent1"/>
-          </a:fillRef>
-          <a:effectRef idx="0">
-            <a:schemeClr val="accent1"/>
-          </a:effectRef>
-          <a:fontRef idx="minor">
-            <a:schemeClr val="lt1"/>
-          </a:fontRef>
-        </p:style>
-      </p:sp>
-      <p:graphicFrame>
-        <p:nvGraphicFramePr>
-          <p:cNvPr id="5" name="Content Placeholder 2">
-            <a:extLst>
-              <a:ext uri="{FF2B5EF4-FFF2-40B4-BE49-F238E27FC236}">
-                <a16:creationId xmlns:a16="http://schemas.microsoft.com/office/drawing/2014/main" id="{309BE5D2-E9CA-4476-BC68-713F1871E7C0}"/>
-              </a:ext>
-            </a:extLst>
-          </p:cNvPr>
-          <p:cNvGraphicFramePr>
-            <a:graphicFrameLocks noGrp="1"/>
-          </p:cNvGraphicFramePr>
-          <p:nvPr>
-            <p:ph idx="1"/>
-            <p:extLst>
-              <p:ext uri="{D42A27DB-BD31-4B8C-83A1-F6EECF244321}">
-                <p14:modId xmlns:p14="http://schemas.microsoft.com/office/powerpoint/2010/main" val="4184016602"/>
-              </p:ext>
-            </p:extLst>
-          </p:nvPr>
-        </p:nvGraphicFramePr>
-        <p:xfrm>
-          <a:off x="1262063" y="2013055"/>
-          <a:ext cx="9858191" cy="4201478"/>
-        </p:xfrm>
-        <a:graphic>
-          <a:graphicData uri="http://schemas.openxmlformats.org/drawingml/2006/diagram">
-            <dgm:relIds xmlns:dgm="http://schemas.openxmlformats.org/drawingml/2006/diagram" xmlns:r="http://schemas.openxmlformats.org/officeDocument/2006/relationships" r:dm="rId2" r:lo="rId3" r:qs="rId4" r:cs="rId5"/>
-          </a:graphicData>
-        </a:graphic>
-      </p:graphicFrame>
     </p:spTree>
     <p:extLst>
       <p:ext uri="{BB962C8B-B14F-4D97-AF65-F5344CB8AC3E}">
-        <p14:creationId xmlns:p14="http://schemas.microsoft.com/office/powerpoint/2010/main" val="4130503848"/>
+        <p14:creationId xmlns:p14="http://schemas.microsoft.com/office/powerpoint/2010/main" val="1015811613"/>
       </p:ext>
     </p:extLst>
   </p:cSld>
@@ -38602,8 +38677,8 @@
           </a:p>
         </p:txBody>
       </p:sp>
-      <mc:AlternateContent xmlns:mc="http://schemas.openxmlformats.org/markup-compatibility/2006">
-        <mc:Choice xmlns:a14="http://schemas.microsoft.com/office/drawing/2010/main" Requires="a14">
+      <mc:AlternateContent xmlns:mc="http://schemas.openxmlformats.org/markup-compatibility/2006" xmlns:a14="http://schemas.microsoft.com/office/drawing/2010/main">
+        <mc:Choice Requires="a14">
           <p:sp>
             <p:nvSpPr>
               <p:cNvPr id="4" name="Content Placeholder 3">
@@ -38717,7 +38792,7 @@
             </p:txBody>
           </p:sp>
         </mc:Choice>
-        <mc:Fallback>
+        <mc:Fallback xmlns="">
           <p:sp>
             <p:nvSpPr>
               <p:cNvPr id="4" name="Content Placeholder 3">
@@ -38785,8 +38860,8 @@
           </a:p>
         </p:txBody>
       </p:sp>
-      <mc:AlternateContent xmlns:mc="http://schemas.openxmlformats.org/markup-compatibility/2006">
-        <mc:Choice xmlns:a14="http://schemas.microsoft.com/office/drawing/2010/main" Requires="a14">
+      <mc:AlternateContent xmlns:mc="http://schemas.openxmlformats.org/markup-compatibility/2006" xmlns:a14="http://schemas.microsoft.com/office/drawing/2010/main">
+        <mc:Choice Requires="a14">
           <p:sp>
             <p:nvSpPr>
               <p:cNvPr id="6" name="Content Placeholder 5">
@@ -38912,7 +38987,7 @@
             </p:txBody>
           </p:sp>
         </mc:Choice>
-        <mc:Fallback>
+        <mc:Fallback xmlns="">
           <p:sp>
             <p:nvSpPr>
               <p:cNvPr id="6" name="Content Placeholder 5">
@@ -39038,8 +39113,8 @@
           </a:p>
         </p:txBody>
       </p:sp>
-      <mc:AlternateContent xmlns:mc="http://schemas.openxmlformats.org/markup-compatibility/2006">
-        <mc:Choice xmlns:a14="http://schemas.microsoft.com/office/drawing/2010/main" Requires="a14">
+      <mc:AlternateContent xmlns:mc="http://schemas.openxmlformats.org/markup-compatibility/2006" xmlns:a14="http://schemas.microsoft.com/office/drawing/2010/main">
+        <mc:Choice Requires="a14">
           <p:sp>
             <p:nvSpPr>
               <p:cNvPr id="4" name="Content Placeholder 3">
@@ -39184,7 +39259,7 @@
             </p:txBody>
           </p:sp>
         </mc:Choice>
-        <mc:Fallback>
+        <mc:Fallback xmlns="">
           <p:sp>
             <p:nvSpPr>
               <p:cNvPr id="4" name="Content Placeholder 3">
@@ -39252,8 +39327,8 @@
           </a:p>
         </p:txBody>
       </p:sp>
-      <mc:AlternateContent xmlns:mc="http://schemas.openxmlformats.org/markup-compatibility/2006">
-        <mc:Choice xmlns:a14="http://schemas.microsoft.com/office/drawing/2010/main" Requires="a14">
+      <mc:AlternateContent xmlns:mc="http://schemas.openxmlformats.org/markup-compatibility/2006" xmlns:a14="http://schemas.microsoft.com/office/drawing/2010/main">
+        <mc:Choice Requires="a14">
           <p:sp>
             <p:nvSpPr>
               <p:cNvPr id="6" name="Content Placeholder 5">
@@ -39321,19 +39396,7 @@
                             <a:rPr lang="en-US" b="0" i="1" smtClean="0">
                               <a:latin typeface="Cambria Math" panose="02040503050406030204" pitchFamily="18" charset="0"/>
                             </a:rPr>
-                            <m:t>𝑃𝑟𝑒𝑐</m:t>
-                          </m:r>
-                          <m:r>
-                            <a:rPr lang="en-US" b="0" i="1" smtClean="0">
-                              <a:latin typeface="Cambria Math" panose="02040503050406030204" pitchFamily="18" charset="0"/>
-                            </a:rPr>
-                            <m:t>𝑖𝑠</m:t>
-                          </m:r>
-                          <m:r>
-                            <a:rPr lang="en-US" b="0" i="1" smtClean="0">
-                              <a:latin typeface="Cambria Math" panose="02040503050406030204" pitchFamily="18" charset="0"/>
-                            </a:rPr>
-                            <m:t>𝑖𝑜𝑛</m:t>
+                            <m:t>𝑃𝑟𝑒𝑐𝑖𝑠𝑖𝑜𝑛</m:t>
                           </m:r>
                           <m:r>
                             <a:rPr lang="en-US" b="0" i="1" smtClean="0">
@@ -39397,7 +39460,7 @@
             </p:txBody>
           </p:sp>
         </mc:Choice>
-        <mc:Fallback>
+        <mc:Fallback xmlns="">
           <p:sp>
             <p:nvSpPr>
               <p:cNvPr id="6" name="Content Placeholder 5">

</xml_diff>